<commit_message>
Updated "How do I" section
</commit_message>
<xml_diff>
--- a/Git, Github, and Github Desktop.pptx
+++ b/Git, Github, and Github Desktop.pptx
@@ -604,7 +604,7 @@
           <a:noFill/>
           <a:extLst>
             <a:ext uri="{909E8E84-426E-40dd-AFC4-6F175D3DCCD1}">
-              <a14:hiddenFill xmlns="" xmlns:a14="http://schemas.microsoft.com/office/drawing/2010/main">
+              <a14:hiddenFill xmlns:a14="http://schemas.microsoft.com/office/drawing/2010/main" xmlns="">
                 <a:solidFill>
                   <a:srgbClr val="FFFFFF"/>
                 </a:solidFill>
@@ -664,7 +664,7 @@
             </a:ln>
             <a:extLst>
               <a:ext uri="{91240B29-F687-4f45-9708-019B960494DF}">
-                <a14:hiddenLine xmlns="" xmlns:a14="http://schemas.microsoft.com/office/drawing/2010/main" w="9525">
+                <a14:hiddenLine xmlns:a14="http://schemas.microsoft.com/office/drawing/2010/main" xmlns="" w="9525">
                   <a:solidFill>
                     <a:srgbClr val="000000"/>
                   </a:solidFill>
@@ -754,7 +754,7 @@
             </a:ln>
             <a:extLst>
               <a:ext uri="{91240B29-F687-4f45-9708-019B960494DF}">
-                <a14:hiddenLine xmlns="" xmlns:a14="http://schemas.microsoft.com/office/drawing/2010/main" w="9525">
+                <a14:hiddenLine xmlns:a14="http://schemas.microsoft.com/office/drawing/2010/main" xmlns="" w="9525">
                   <a:solidFill>
                     <a:srgbClr val="000000"/>
                   </a:solidFill>
@@ -844,7 +844,7 @@
             </a:ln>
             <a:extLst>
               <a:ext uri="{91240B29-F687-4f45-9708-019B960494DF}">
-                <a14:hiddenLine xmlns="" xmlns:a14="http://schemas.microsoft.com/office/drawing/2010/main" w="9525">
+                <a14:hiddenLine xmlns:a14="http://schemas.microsoft.com/office/drawing/2010/main" xmlns="" w="9525">
                   <a:solidFill>
                     <a:srgbClr val="000000"/>
                   </a:solidFill>
@@ -878,7 +878,7 @@
             </a:ln>
             <a:extLst>
               <a:ext uri="{91240B29-F687-4f45-9708-019B960494DF}">
-                <a14:hiddenLine xmlns="" xmlns:a14="http://schemas.microsoft.com/office/drawing/2010/main" w="9525">
+                <a14:hiddenLine xmlns:a14="http://schemas.microsoft.com/office/drawing/2010/main" xmlns="" w="9525">
                   <a:solidFill>
                     <a:srgbClr val="000000"/>
                   </a:solidFill>
@@ -968,7 +968,7 @@
             </a:ln>
             <a:extLst>
               <a:ext uri="{91240B29-F687-4f45-9708-019B960494DF}">
-                <a14:hiddenLine xmlns="" xmlns:a14="http://schemas.microsoft.com/office/drawing/2010/main" w="9525">
+                <a14:hiddenLine xmlns:a14="http://schemas.microsoft.com/office/drawing/2010/main" xmlns="" w="9525">
                   <a:solidFill>
                     <a:srgbClr val="000000"/>
                   </a:solidFill>
@@ -1030,7 +1030,7 @@
             </a:ln>
             <a:extLst>
               <a:ext uri="{91240B29-F687-4f45-9708-019B960494DF}">
-                <a14:hiddenLine xmlns="" xmlns:a14="http://schemas.microsoft.com/office/drawing/2010/main" w="9525">
+                <a14:hiddenLine xmlns:a14="http://schemas.microsoft.com/office/drawing/2010/main" xmlns="" w="9525">
                   <a:solidFill>
                     <a:srgbClr val="000000"/>
                   </a:solidFill>
@@ -1092,7 +1092,7 @@
             </a:ln>
             <a:extLst>
               <a:ext uri="{91240B29-F687-4f45-9708-019B960494DF}">
-                <a14:hiddenLine xmlns="" xmlns:a14="http://schemas.microsoft.com/office/drawing/2010/main" w="9525">
+                <a14:hiddenLine xmlns:a14="http://schemas.microsoft.com/office/drawing/2010/main" xmlns="" w="9525">
                   <a:solidFill>
                     <a:srgbClr val="000000"/>
                   </a:solidFill>
@@ -1182,7 +1182,7 @@
             </a:ln>
             <a:extLst>
               <a:ext uri="{91240B29-F687-4f45-9708-019B960494DF}">
-                <a14:hiddenLine xmlns="" xmlns:a14="http://schemas.microsoft.com/office/drawing/2010/main" w="9525">
+                <a14:hiddenLine xmlns:a14="http://schemas.microsoft.com/office/drawing/2010/main" xmlns="" w="9525">
                   <a:solidFill>
                     <a:srgbClr val="000000"/>
                   </a:solidFill>
@@ -1244,7 +1244,7 @@
             </a:ln>
             <a:extLst>
               <a:ext uri="{91240B29-F687-4f45-9708-019B960494DF}">
-                <a14:hiddenLine xmlns="" xmlns:a14="http://schemas.microsoft.com/office/drawing/2010/main" w="9525">
+                <a14:hiddenLine xmlns:a14="http://schemas.microsoft.com/office/drawing/2010/main" xmlns="" w="9525">
                   <a:solidFill>
                     <a:srgbClr val="000000"/>
                   </a:solidFill>
@@ -1306,7 +1306,7 @@
             </a:ln>
             <a:extLst>
               <a:ext uri="{91240B29-F687-4f45-9708-019B960494DF}">
-                <a14:hiddenLine xmlns="" xmlns:a14="http://schemas.microsoft.com/office/drawing/2010/main" w="9525">
+                <a14:hiddenLine xmlns:a14="http://schemas.microsoft.com/office/drawing/2010/main" xmlns="" w="9525">
                   <a:solidFill>
                     <a:srgbClr val="000000"/>
                   </a:solidFill>
@@ -1396,7 +1396,7 @@
             </a:ln>
             <a:extLst>
               <a:ext uri="{91240B29-F687-4f45-9708-019B960494DF}">
-                <a14:hiddenLine xmlns="" xmlns:a14="http://schemas.microsoft.com/office/drawing/2010/main" w="9525">
+                <a14:hiddenLine xmlns:a14="http://schemas.microsoft.com/office/drawing/2010/main" xmlns="" w="9525">
                   <a:solidFill>
                     <a:srgbClr val="000000"/>
                   </a:solidFill>
@@ -1486,7 +1486,7 @@
             </a:ln>
             <a:extLst>
               <a:ext uri="{91240B29-F687-4f45-9708-019B960494DF}">
-                <a14:hiddenLine xmlns="" xmlns:a14="http://schemas.microsoft.com/office/drawing/2010/main" w="9525">
+                <a14:hiddenLine xmlns:a14="http://schemas.microsoft.com/office/drawing/2010/main" xmlns="" w="9525">
                   <a:solidFill>
                     <a:srgbClr val="000000"/>
                   </a:solidFill>
@@ -1548,7 +1548,7 @@
             </a:ln>
             <a:extLst>
               <a:ext uri="{91240B29-F687-4f45-9708-019B960494DF}">
-                <a14:hiddenLine xmlns="" xmlns:a14="http://schemas.microsoft.com/office/drawing/2010/main" w="9525">
+                <a14:hiddenLine xmlns:a14="http://schemas.microsoft.com/office/drawing/2010/main" xmlns="" w="9525">
                   <a:solidFill>
                     <a:srgbClr val="000000"/>
                   </a:solidFill>
@@ -1658,7 +1658,7 @@
             </a:ln>
             <a:extLst>
               <a:ext uri="{91240B29-F687-4f45-9708-019B960494DF}">
-                <a14:hiddenLine xmlns="" xmlns:a14="http://schemas.microsoft.com/office/drawing/2010/main" w="9525">
+                <a14:hiddenLine xmlns:a14="http://schemas.microsoft.com/office/drawing/2010/main" xmlns="" w="9525">
                   <a:solidFill>
                     <a:srgbClr val="000000"/>
                   </a:solidFill>
@@ -1720,7 +1720,7 @@
             </a:ln>
             <a:extLst>
               <a:ext uri="{91240B29-F687-4f45-9708-019B960494DF}">
-                <a14:hiddenLine xmlns="" xmlns:a14="http://schemas.microsoft.com/office/drawing/2010/main" w="9525">
+                <a14:hiddenLine xmlns:a14="http://schemas.microsoft.com/office/drawing/2010/main" xmlns="" w="9525">
                   <a:solidFill>
                     <a:srgbClr val="000000"/>
                   </a:solidFill>
@@ -1810,7 +1810,7 @@
             </a:ln>
             <a:extLst>
               <a:ext uri="{91240B29-F687-4f45-9708-019B960494DF}">
-                <a14:hiddenLine xmlns="" xmlns:a14="http://schemas.microsoft.com/office/drawing/2010/main" w="9525">
+                <a14:hiddenLine xmlns:a14="http://schemas.microsoft.com/office/drawing/2010/main" xmlns="" w="9525">
                   <a:solidFill>
                     <a:srgbClr val="000000"/>
                   </a:solidFill>
@@ -1900,7 +1900,7 @@
             </a:ln>
             <a:extLst>
               <a:ext uri="{91240B29-F687-4f45-9708-019B960494DF}">
-                <a14:hiddenLine xmlns="" xmlns:a14="http://schemas.microsoft.com/office/drawing/2010/main" w="9525">
+                <a14:hiddenLine xmlns:a14="http://schemas.microsoft.com/office/drawing/2010/main" xmlns="" w="9525">
                   <a:solidFill>
                     <a:srgbClr val="000000"/>
                   </a:solidFill>
@@ -1962,7 +1962,7 @@
             </a:ln>
             <a:extLst>
               <a:ext uri="{91240B29-F687-4f45-9708-019B960494DF}">
-                <a14:hiddenLine xmlns="" xmlns:a14="http://schemas.microsoft.com/office/drawing/2010/main" w="9525">
+                <a14:hiddenLine xmlns:a14="http://schemas.microsoft.com/office/drawing/2010/main" xmlns="" w="9525">
                   <a:solidFill>
                     <a:srgbClr val="000000"/>
                   </a:solidFill>
@@ -2052,7 +2052,7 @@
             </a:ln>
             <a:extLst>
               <a:ext uri="{91240B29-F687-4f45-9708-019B960494DF}">
-                <a14:hiddenLine xmlns="" xmlns:a14="http://schemas.microsoft.com/office/drawing/2010/main" w="9525">
+                <a14:hiddenLine xmlns:a14="http://schemas.microsoft.com/office/drawing/2010/main" xmlns="" w="9525">
                   <a:solidFill>
                     <a:srgbClr val="000000"/>
                   </a:solidFill>
@@ -2142,7 +2142,7 @@
             </a:ln>
             <a:extLst>
               <a:ext uri="{91240B29-F687-4f45-9708-019B960494DF}">
-                <a14:hiddenLine xmlns="" xmlns:a14="http://schemas.microsoft.com/office/drawing/2010/main" w="9525">
+                <a14:hiddenLine xmlns:a14="http://schemas.microsoft.com/office/drawing/2010/main" xmlns="" w="9525">
                   <a:solidFill>
                     <a:srgbClr val="000000"/>
                   </a:solidFill>
@@ -2198,7 +2198,7 @@
             </a:ln>
             <a:extLst>
               <a:ext uri="{91240B29-F687-4f45-9708-019B960494DF}">
-                <a14:hiddenLine xmlns="" xmlns:a14="http://schemas.microsoft.com/office/drawing/2010/main" w="9525">
+                <a14:hiddenLine xmlns:a14="http://schemas.microsoft.com/office/drawing/2010/main" xmlns="" w="9525">
                   <a:solidFill>
                     <a:srgbClr val="000000"/>
                   </a:solidFill>
@@ -2288,7 +2288,7 @@
             </a:ln>
             <a:extLst>
               <a:ext uri="{91240B29-F687-4f45-9708-019B960494DF}">
-                <a14:hiddenLine xmlns="" xmlns:a14="http://schemas.microsoft.com/office/drawing/2010/main" w="9525">
+                <a14:hiddenLine xmlns:a14="http://schemas.microsoft.com/office/drawing/2010/main" xmlns="" w="9525">
                   <a:solidFill>
                     <a:srgbClr val="000000"/>
                   </a:solidFill>
@@ -2344,7 +2344,7 @@
             </a:ln>
             <a:extLst>
               <a:ext uri="{91240B29-F687-4f45-9708-019B960494DF}">
-                <a14:hiddenLine xmlns="" xmlns:a14="http://schemas.microsoft.com/office/drawing/2010/main" w="9525">
+                <a14:hiddenLine xmlns:a14="http://schemas.microsoft.com/office/drawing/2010/main" xmlns="" w="9525">
                   <a:solidFill>
                     <a:srgbClr val="000000"/>
                   </a:solidFill>
@@ -2434,7 +2434,7 @@
             </a:ln>
             <a:extLst>
               <a:ext uri="{91240B29-F687-4f45-9708-019B960494DF}">
-                <a14:hiddenLine xmlns="" xmlns:a14="http://schemas.microsoft.com/office/drawing/2010/main" w="9525">
+                <a14:hiddenLine xmlns:a14="http://schemas.microsoft.com/office/drawing/2010/main" xmlns="" w="9525">
                   <a:solidFill>
                     <a:srgbClr val="000000"/>
                   </a:solidFill>
@@ -2502,7 +2502,7 @@
             </a:ln>
             <a:extLst>
               <a:ext uri="{91240B29-F687-4f45-9708-019B960494DF}">
-                <a14:hiddenLine xmlns="" xmlns:a14="http://schemas.microsoft.com/office/drawing/2010/main" w="9525">
+                <a14:hiddenLine xmlns:a14="http://schemas.microsoft.com/office/drawing/2010/main" xmlns="" w="9525">
                   <a:solidFill>
                     <a:srgbClr val="000000"/>
                   </a:solidFill>
@@ -2592,7 +2592,7 @@
             </a:ln>
             <a:extLst>
               <a:ext uri="{91240B29-F687-4f45-9708-019B960494DF}">
-                <a14:hiddenLine xmlns="" xmlns:a14="http://schemas.microsoft.com/office/drawing/2010/main" w="9525">
+                <a14:hiddenLine xmlns:a14="http://schemas.microsoft.com/office/drawing/2010/main" xmlns="" w="9525">
                   <a:solidFill>
                     <a:srgbClr val="000000"/>
                   </a:solidFill>
@@ -2660,7 +2660,7 @@
             </a:ln>
             <a:extLst>
               <a:ext uri="{91240B29-F687-4f45-9708-019B960494DF}">
-                <a14:hiddenLine xmlns="" xmlns:a14="http://schemas.microsoft.com/office/drawing/2010/main" w="9525">
+                <a14:hiddenLine xmlns:a14="http://schemas.microsoft.com/office/drawing/2010/main" xmlns="" w="9525">
                   <a:solidFill>
                     <a:srgbClr val="000000"/>
                   </a:solidFill>
@@ -2750,7 +2750,7 @@
             </a:ln>
             <a:extLst>
               <a:ext uri="{91240B29-F687-4f45-9708-019B960494DF}">
-                <a14:hiddenLine xmlns="" xmlns:a14="http://schemas.microsoft.com/office/drawing/2010/main" w="9525">
+                <a14:hiddenLine xmlns:a14="http://schemas.microsoft.com/office/drawing/2010/main" xmlns="" w="9525">
                   <a:solidFill>
                     <a:srgbClr val="000000"/>
                   </a:solidFill>
@@ -2784,7 +2784,7 @@
             </a:ln>
             <a:extLst>
               <a:ext uri="{91240B29-F687-4f45-9708-019B960494DF}">
-                <a14:hiddenLine xmlns="" xmlns:a14="http://schemas.microsoft.com/office/drawing/2010/main" w="9525">
+                <a14:hiddenLine xmlns:a14="http://schemas.microsoft.com/office/drawing/2010/main" xmlns="" w="9525">
                   <a:solidFill>
                     <a:srgbClr val="000000"/>
                   </a:solidFill>
@@ -2874,7 +2874,7 @@
             </a:ln>
             <a:extLst>
               <a:ext uri="{91240B29-F687-4f45-9708-019B960494DF}">
-                <a14:hiddenLine xmlns="" xmlns:a14="http://schemas.microsoft.com/office/drawing/2010/main" w="9525">
+                <a14:hiddenLine xmlns:a14="http://schemas.microsoft.com/office/drawing/2010/main" xmlns="" w="9525">
                   <a:solidFill>
                     <a:srgbClr val="000000"/>
                   </a:solidFill>
@@ -2936,7 +2936,7 @@
             </a:ln>
             <a:extLst>
               <a:ext uri="{91240B29-F687-4f45-9708-019B960494DF}">
-                <a14:hiddenLine xmlns="" xmlns:a14="http://schemas.microsoft.com/office/drawing/2010/main" w="9525">
+                <a14:hiddenLine xmlns:a14="http://schemas.microsoft.com/office/drawing/2010/main" xmlns="" w="9525">
                   <a:solidFill>
                     <a:srgbClr val="000000"/>
                   </a:solidFill>
@@ -2998,7 +2998,7 @@
             </a:ln>
             <a:extLst>
               <a:ext uri="{91240B29-F687-4f45-9708-019B960494DF}">
-                <a14:hiddenLine xmlns="" xmlns:a14="http://schemas.microsoft.com/office/drawing/2010/main" w="9525">
+                <a14:hiddenLine xmlns:a14="http://schemas.microsoft.com/office/drawing/2010/main" xmlns="" w="9525">
                   <a:solidFill>
                     <a:srgbClr val="000000"/>
                   </a:solidFill>
@@ -3088,7 +3088,7 @@
             </a:ln>
             <a:extLst>
               <a:ext uri="{91240B29-F687-4f45-9708-019B960494DF}">
-                <a14:hiddenLine xmlns="" xmlns:a14="http://schemas.microsoft.com/office/drawing/2010/main" w="9525">
+                <a14:hiddenLine xmlns:a14="http://schemas.microsoft.com/office/drawing/2010/main" xmlns="" w="9525">
                   <a:solidFill>
                     <a:srgbClr val="000000"/>
                   </a:solidFill>
@@ -3156,7 +3156,7 @@
             </a:ln>
             <a:extLst>
               <a:ext uri="{91240B29-F687-4f45-9708-019B960494DF}">
-                <a14:hiddenLine xmlns="" xmlns:a14="http://schemas.microsoft.com/office/drawing/2010/main" w="9525">
+                <a14:hiddenLine xmlns:a14="http://schemas.microsoft.com/office/drawing/2010/main" xmlns="" w="9525">
                   <a:solidFill>
                     <a:srgbClr val="000000"/>
                   </a:solidFill>
@@ -3218,7 +3218,7 @@
             </a:ln>
             <a:extLst>
               <a:ext uri="{91240B29-F687-4f45-9708-019B960494DF}">
-                <a14:hiddenLine xmlns="" xmlns:a14="http://schemas.microsoft.com/office/drawing/2010/main" w="9525">
+                <a14:hiddenLine xmlns:a14="http://schemas.microsoft.com/office/drawing/2010/main" xmlns="" w="9525">
                   <a:solidFill>
                     <a:srgbClr val="000000"/>
                   </a:solidFill>
@@ -3308,7 +3308,7 @@
             </a:ln>
             <a:extLst>
               <a:ext uri="{91240B29-F687-4f45-9708-019B960494DF}">
-                <a14:hiddenLine xmlns="" xmlns:a14="http://schemas.microsoft.com/office/drawing/2010/main" w="9525">
+                <a14:hiddenLine xmlns:a14="http://schemas.microsoft.com/office/drawing/2010/main" xmlns="" w="9525">
                   <a:solidFill>
                     <a:srgbClr val="000000"/>
                   </a:solidFill>
@@ -3370,7 +3370,7 @@
             </a:ln>
             <a:extLst>
               <a:ext uri="{91240B29-F687-4f45-9708-019B960494DF}">
-                <a14:hiddenLine xmlns="" xmlns:a14="http://schemas.microsoft.com/office/drawing/2010/main" w="9525">
+                <a14:hiddenLine xmlns:a14="http://schemas.microsoft.com/office/drawing/2010/main" xmlns="" w="9525">
                   <a:solidFill>
                     <a:srgbClr val="000000"/>
                   </a:solidFill>
@@ -3460,7 +3460,7 @@
             </a:ln>
             <a:extLst>
               <a:ext uri="{91240B29-F687-4f45-9708-019B960494DF}">
-                <a14:hiddenLine xmlns="" xmlns:a14="http://schemas.microsoft.com/office/drawing/2010/main" w="9525">
+                <a14:hiddenLine xmlns:a14="http://schemas.microsoft.com/office/drawing/2010/main" xmlns="" w="9525">
                   <a:solidFill>
                     <a:srgbClr val="000000"/>
                   </a:solidFill>
@@ -3522,7 +3522,7 @@
             </a:ln>
             <a:extLst>
               <a:ext uri="{91240B29-F687-4f45-9708-019B960494DF}">
-                <a14:hiddenLine xmlns="" xmlns:a14="http://schemas.microsoft.com/office/drawing/2010/main" w="9525">
+                <a14:hiddenLine xmlns:a14="http://schemas.microsoft.com/office/drawing/2010/main" xmlns="" w="9525">
                   <a:solidFill>
                     <a:srgbClr val="000000"/>
                   </a:solidFill>
@@ -3612,7 +3612,7 @@
             </a:ln>
             <a:extLst>
               <a:ext uri="{91240B29-F687-4f45-9708-019B960494DF}">
-                <a14:hiddenLine xmlns="" xmlns:a14="http://schemas.microsoft.com/office/drawing/2010/main" w="9525">
+                <a14:hiddenLine xmlns:a14="http://schemas.microsoft.com/office/drawing/2010/main" xmlns="" w="9525">
                   <a:solidFill>
                     <a:srgbClr val="000000"/>
                   </a:solidFill>
@@ -3646,7 +3646,7 @@
             </a:ln>
             <a:extLst>
               <a:ext uri="{91240B29-F687-4f45-9708-019B960494DF}">
-                <a14:hiddenLine xmlns="" xmlns:a14="http://schemas.microsoft.com/office/drawing/2010/main" w="9525">
+                <a14:hiddenLine xmlns:a14="http://schemas.microsoft.com/office/drawing/2010/main" xmlns="" w="9525">
                   <a:solidFill>
                     <a:srgbClr val="000000"/>
                   </a:solidFill>
@@ -3711,7 +3711,7 @@
             </a:ln>
             <a:extLst>
               <a:ext uri="{91240B29-F687-4f45-9708-019B960494DF}">
-                <a14:hiddenLine xmlns="" xmlns:a14="http://schemas.microsoft.com/office/drawing/2010/main" w="9525">
+                <a14:hiddenLine xmlns:a14="http://schemas.microsoft.com/office/drawing/2010/main" xmlns="" w="9525">
                   <a:solidFill>
                     <a:srgbClr val="000000"/>
                   </a:solidFill>
@@ -3801,7 +3801,7 @@
             </a:ln>
             <a:extLst>
               <a:ext uri="{91240B29-F687-4f45-9708-019B960494DF}">
-                <a14:hiddenLine xmlns="" xmlns:a14="http://schemas.microsoft.com/office/drawing/2010/main" w="9525">
+                <a14:hiddenLine xmlns:a14="http://schemas.microsoft.com/office/drawing/2010/main" xmlns="" w="9525">
                   <a:solidFill>
                     <a:srgbClr val="000000"/>
                   </a:solidFill>
@@ -3863,7 +3863,7 @@
             </a:ln>
             <a:extLst>
               <a:ext uri="{91240B29-F687-4f45-9708-019B960494DF}">
-                <a14:hiddenLine xmlns="" xmlns:a14="http://schemas.microsoft.com/office/drawing/2010/main" w="9525">
+                <a14:hiddenLine xmlns:a14="http://schemas.microsoft.com/office/drawing/2010/main" xmlns="" w="9525">
                   <a:solidFill>
                     <a:srgbClr val="000000"/>
                   </a:solidFill>
@@ -3953,7 +3953,7 @@
             </a:ln>
             <a:extLst>
               <a:ext uri="{91240B29-F687-4f45-9708-019B960494DF}">
-                <a14:hiddenLine xmlns="" xmlns:a14="http://schemas.microsoft.com/office/drawing/2010/main" w="9525">
+                <a14:hiddenLine xmlns:a14="http://schemas.microsoft.com/office/drawing/2010/main" xmlns="" w="9525">
                   <a:solidFill>
                     <a:srgbClr val="000000"/>
                   </a:solidFill>
@@ -4043,7 +4043,7 @@
             </a:ln>
             <a:extLst>
               <a:ext uri="{91240B29-F687-4f45-9708-019B960494DF}">
-                <a14:hiddenLine xmlns="" xmlns:a14="http://schemas.microsoft.com/office/drawing/2010/main" w="9525">
+                <a14:hiddenLine xmlns:a14="http://schemas.microsoft.com/office/drawing/2010/main" xmlns="" w="9525">
                   <a:solidFill>
                     <a:srgbClr val="000000"/>
                   </a:solidFill>
@@ -4108,7 +4108,7 @@
             </a:ln>
             <a:extLst>
               <a:ext uri="{91240B29-F687-4f45-9708-019B960494DF}">
-                <a14:hiddenLine xmlns="" xmlns:a14="http://schemas.microsoft.com/office/drawing/2010/main" w="9525">
+                <a14:hiddenLine xmlns:a14="http://schemas.microsoft.com/office/drawing/2010/main" xmlns="" w="9525">
                   <a:solidFill>
                     <a:srgbClr val="000000"/>
                   </a:solidFill>
@@ -4170,7 +4170,7 @@
             </a:ln>
             <a:extLst>
               <a:ext uri="{91240B29-F687-4f45-9708-019B960494DF}">
-                <a14:hiddenLine xmlns="" xmlns:a14="http://schemas.microsoft.com/office/drawing/2010/main" w="9525">
+                <a14:hiddenLine xmlns:a14="http://schemas.microsoft.com/office/drawing/2010/main" xmlns="" w="9525">
                   <a:solidFill>
                     <a:srgbClr val="000000"/>
                   </a:solidFill>
@@ -4260,7 +4260,7 @@
             </a:ln>
             <a:extLst>
               <a:ext uri="{91240B29-F687-4f45-9708-019B960494DF}">
-                <a14:hiddenLine xmlns="" xmlns:a14="http://schemas.microsoft.com/office/drawing/2010/main" w="9525">
+                <a14:hiddenLine xmlns:a14="http://schemas.microsoft.com/office/drawing/2010/main" xmlns="" w="9525">
                   <a:solidFill>
                     <a:srgbClr val="000000"/>
                   </a:solidFill>
@@ -4350,7 +4350,7 @@
             </a:ln>
             <a:extLst>
               <a:ext uri="{91240B29-F687-4f45-9708-019B960494DF}">
-                <a14:hiddenLine xmlns="" xmlns:a14="http://schemas.microsoft.com/office/drawing/2010/main" w="9525">
+                <a14:hiddenLine xmlns:a14="http://schemas.microsoft.com/office/drawing/2010/main" xmlns="" w="9525">
                   <a:solidFill>
                     <a:srgbClr val="000000"/>
                   </a:solidFill>
@@ -4412,7 +4412,7 @@
             </a:ln>
             <a:extLst>
               <a:ext uri="{91240B29-F687-4f45-9708-019B960494DF}">
-                <a14:hiddenLine xmlns="" xmlns:a14="http://schemas.microsoft.com/office/drawing/2010/main" w="9525">
+                <a14:hiddenLine xmlns:a14="http://schemas.microsoft.com/office/drawing/2010/main" xmlns="" w="9525">
                   <a:solidFill>
                     <a:srgbClr val="000000"/>
                   </a:solidFill>
@@ -4532,7 +4532,7 @@
             </a:ln>
             <a:extLst>
               <a:ext uri="{91240B29-F687-4f45-9708-019B960494DF}">
-                <a14:hiddenLine xmlns="" xmlns:a14="http://schemas.microsoft.com/office/drawing/2010/main" w="9525">
+                <a14:hiddenLine xmlns:a14="http://schemas.microsoft.com/office/drawing/2010/main" xmlns="" w="9525">
                   <a:solidFill>
                     <a:srgbClr val="000000"/>
                   </a:solidFill>
@@ -4600,7 +4600,7 @@
             </a:ln>
             <a:extLst>
               <a:ext uri="{91240B29-F687-4f45-9708-019B960494DF}">
-                <a14:hiddenLine xmlns="" xmlns:a14="http://schemas.microsoft.com/office/drawing/2010/main" w="9525">
+                <a14:hiddenLine xmlns:a14="http://schemas.microsoft.com/office/drawing/2010/main" xmlns="" w="9525">
                   <a:solidFill>
                     <a:srgbClr val="000000"/>
                   </a:solidFill>
@@ -4690,7 +4690,7 @@
             </a:ln>
             <a:extLst>
               <a:ext uri="{91240B29-F687-4f45-9708-019B960494DF}">
-                <a14:hiddenLine xmlns="" xmlns:a14="http://schemas.microsoft.com/office/drawing/2010/main" w="9525">
+                <a14:hiddenLine xmlns:a14="http://schemas.microsoft.com/office/drawing/2010/main" xmlns="" w="9525">
                   <a:solidFill>
                     <a:srgbClr val="000000"/>
                   </a:solidFill>
@@ -9412,7 +9412,7 @@
           <a:noFill/>
           <a:extLst>
             <a:ext uri="{909E8E84-426E-40dd-AFC4-6F175D3DCCD1}">
-              <a14:hiddenFill xmlns="" xmlns:a14="http://schemas.microsoft.com/office/drawing/2010/main">
+              <a14:hiddenFill xmlns:a14="http://schemas.microsoft.com/office/drawing/2010/main" xmlns="">
                 <a:solidFill>
                   <a:srgbClr val="FFFFFF"/>
                 </a:solidFill>
@@ -9486,7 +9486,7 @@
               </a:ln>
               <a:extLst>
                 <a:ext uri="{91240B29-F687-4f45-9708-019B960494DF}">
-                  <a14:hiddenLine xmlns="" xmlns:a14="http://schemas.microsoft.com/office/drawing/2010/main" w="9525">
+                  <a14:hiddenLine xmlns:a14="http://schemas.microsoft.com/office/drawing/2010/main" xmlns="" w="9525">
                     <a:solidFill>
                       <a:srgbClr val="000000"/>
                     </a:solidFill>
@@ -9576,7 +9576,7 @@
               </a:ln>
               <a:extLst>
                 <a:ext uri="{91240B29-F687-4f45-9708-019B960494DF}">
-                  <a14:hiddenLine xmlns="" xmlns:a14="http://schemas.microsoft.com/office/drawing/2010/main" w="9525">
+                  <a14:hiddenLine xmlns:a14="http://schemas.microsoft.com/office/drawing/2010/main" xmlns="" w="9525">
                     <a:solidFill>
                       <a:srgbClr val="000000"/>
                     </a:solidFill>
@@ -9666,7 +9666,7 @@
               </a:ln>
               <a:extLst>
                 <a:ext uri="{91240B29-F687-4f45-9708-019B960494DF}">
-                  <a14:hiddenLine xmlns="" xmlns:a14="http://schemas.microsoft.com/office/drawing/2010/main" w="9525">
+                  <a14:hiddenLine xmlns:a14="http://schemas.microsoft.com/office/drawing/2010/main" xmlns="" w="9525">
                     <a:solidFill>
                       <a:srgbClr val="000000"/>
                     </a:solidFill>
@@ -9728,7 +9728,7 @@
               </a:ln>
               <a:extLst>
                 <a:ext uri="{91240B29-F687-4f45-9708-019B960494DF}">
-                  <a14:hiddenLine xmlns="" xmlns:a14="http://schemas.microsoft.com/office/drawing/2010/main" w="9525">
+                  <a14:hiddenLine xmlns:a14="http://schemas.microsoft.com/office/drawing/2010/main" xmlns="" w="9525">
                     <a:solidFill>
                       <a:srgbClr val="000000"/>
                     </a:solidFill>
@@ -9818,7 +9818,7 @@
               </a:ln>
               <a:extLst>
                 <a:ext uri="{91240B29-F687-4f45-9708-019B960494DF}">
-                  <a14:hiddenLine xmlns="" xmlns:a14="http://schemas.microsoft.com/office/drawing/2010/main" w="9525">
+                  <a14:hiddenLine xmlns:a14="http://schemas.microsoft.com/office/drawing/2010/main" xmlns="" w="9525">
                     <a:solidFill>
                       <a:srgbClr val="000000"/>
                     </a:solidFill>
@@ -9880,7 +9880,7 @@
               </a:ln>
               <a:extLst>
                 <a:ext uri="{91240B29-F687-4f45-9708-019B960494DF}">
-                  <a14:hiddenLine xmlns="" xmlns:a14="http://schemas.microsoft.com/office/drawing/2010/main" w="9525">
+                  <a14:hiddenLine xmlns:a14="http://schemas.microsoft.com/office/drawing/2010/main" xmlns="" w="9525">
                     <a:solidFill>
                       <a:srgbClr val="000000"/>
                     </a:solidFill>
@@ -9942,7 +9942,7 @@
               </a:ln>
               <a:extLst>
                 <a:ext uri="{91240B29-F687-4f45-9708-019B960494DF}">
-                  <a14:hiddenLine xmlns="" xmlns:a14="http://schemas.microsoft.com/office/drawing/2010/main" w="9525">
+                  <a14:hiddenLine xmlns:a14="http://schemas.microsoft.com/office/drawing/2010/main" xmlns="" w="9525">
                     <a:solidFill>
                       <a:srgbClr val="000000"/>
                     </a:solidFill>
@@ -10032,7 +10032,7 @@
               </a:ln>
               <a:extLst>
                 <a:ext uri="{91240B29-F687-4f45-9708-019B960494DF}">
-                  <a14:hiddenLine xmlns="" xmlns:a14="http://schemas.microsoft.com/office/drawing/2010/main" w="9525">
+                  <a14:hiddenLine xmlns:a14="http://schemas.microsoft.com/office/drawing/2010/main" xmlns="" w="9525">
                     <a:solidFill>
                       <a:srgbClr val="000000"/>
                     </a:solidFill>
@@ -10122,7 +10122,7 @@
               </a:ln>
               <a:extLst>
                 <a:ext uri="{91240B29-F687-4f45-9708-019B960494DF}">
-                  <a14:hiddenLine xmlns="" xmlns:a14="http://schemas.microsoft.com/office/drawing/2010/main" w="9525">
+                  <a14:hiddenLine xmlns:a14="http://schemas.microsoft.com/office/drawing/2010/main" xmlns="" w="9525">
                     <a:solidFill>
                       <a:srgbClr val="000000"/>
                     </a:solidFill>
@@ -10184,7 +10184,7 @@
               </a:ln>
               <a:extLst>
                 <a:ext uri="{91240B29-F687-4f45-9708-019B960494DF}">
-                  <a14:hiddenLine xmlns="" xmlns:a14="http://schemas.microsoft.com/office/drawing/2010/main" w="9525">
+                  <a14:hiddenLine xmlns:a14="http://schemas.microsoft.com/office/drawing/2010/main" xmlns="" w="9525">
                     <a:solidFill>
                       <a:srgbClr val="000000"/>
                     </a:solidFill>
@@ -10294,7 +10294,7 @@
               </a:ln>
               <a:extLst>
                 <a:ext uri="{91240B29-F687-4f45-9708-019B960494DF}">
-                  <a14:hiddenLine xmlns="" xmlns:a14="http://schemas.microsoft.com/office/drawing/2010/main" w="9525">
+                  <a14:hiddenLine xmlns:a14="http://schemas.microsoft.com/office/drawing/2010/main" xmlns="" w="9525">
                     <a:solidFill>
                       <a:srgbClr val="000000"/>
                     </a:solidFill>
@@ -10378,7 +10378,7 @@
               </a:ln>
               <a:extLst>
                 <a:ext uri="{91240B29-F687-4f45-9708-019B960494DF}">
-                  <a14:hiddenLine xmlns="" xmlns:a14="http://schemas.microsoft.com/office/drawing/2010/main" w="9525">
+                  <a14:hiddenLine xmlns:a14="http://schemas.microsoft.com/office/drawing/2010/main" xmlns="" w="9525">
                     <a:solidFill>
                       <a:srgbClr val="000000"/>
                     </a:solidFill>
@@ -10440,7 +10440,7 @@
               </a:ln>
               <a:extLst>
                 <a:ext uri="{91240B29-F687-4f45-9708-019B960494DF}">
-                  <a14:hiddenLine xmlns="" xmlns:a14="http://schemas.microsoft.com/office/drawing/2010/main" w="9525">
+                  <a14:hiddenLine xmlns:a14="http://schemas.microsoft.com/office/drawing/2010/main" xmlns="" w="9525">
                     <a:solidFill>
                       <a:srgbClr val="000000"/>
                     </a:solidFill>
@@ -10502,7 +10502,7 @@
               </a:ln>
               <a:extLst>
                 <a:ext uri="{91240B29-F687-4f45-9708-019B960494DF}">
-                  <a14:hiddenLine xmlns="" xmlns:a14="http://schemas.microsoft.com/office/drawing/2010/main" w="9525">
+                  <a14:hiddenLine xmlns:a14="http://schemas.microsoft.com/office/drawing/2010/main" xmlns="" w="9525">
                     <a:solidFill>
                       <a:srgbClr val="000000"/>
                     </a:solidFill>
@@ -10592,7 +10592,7 @@
               </a:ln>
               <a:extLst>
                 <a:ext uri="{91240B29-F687-4f45-9708-019B960494DF}">
-                  <a14:hiddenLine xmlns="" xmlns:a14="http://schemas.microsoft.com/office/drawing/2010/main" w="9525">
+                  <a14:hiddenLine xmlns:a14="http://schemas.microsoft.com/office/drawing/2010/main" xmlns="" w="9525">
                     <a:solidFill>
                       <a:srgbClr val="000000"/>
                     </a:solidFill>
@@ -10626,7 +10626,7 @@
               </a:ln>
               <a:extLst>
                 <a:ext uri="{91240B29-F687-4f45-9708-019B960494DF}">
-                  <a14:hiddenLine xmlns="" xmlns:a14="http://schemas.microsoft.com/office/drawing/2010/main" w="9525">
+                  <a14:hiddenLine xmlns:a14="http://schemas.microsoft.com/office/drawing/2010/main" xmlns="" w="9525">
                     <a:solidFill>
                       <a:srgbClr val="000000"/>
                     </a:solidFill>
@@ -10691,7 +10691,7 @@
               </a:ln>
               <a:extLst>
                 <a:ext uri="{91240B29-F687-4f45-9708-019B960494DF}">
-                  <a14:hiddenLine xmlns="" xmlns:a14="http://schemas.microsoft.com/office/drawing/2010/main" w="9525">
+                  <a14:hiddenLine xmlns:a14="http://schemas.microsoft.com/office/drawing/2010/main" xmlns="" w="9525">
                     <a:solidFill>
                       <a:srgbClr val="000000"/>
                     </a:solidFill>
@@ -10781,7 +10781,7 @@
               </a:ln>
               <a:extLst>
                 <a:ext uri="{91240B29-F687-4f45-9708-019B960494DF}">
-                  <a14:hiddenLine xmlns="" xmlns:a14="http://schemas.microsoft.com/office/drawing/2010/main" w="9525">
+                  <a14:hiddenLine xmlns:a14="http://schemas.microsoft.com/office/drawing/2010/main" xmlns="" w="9525">
                     <a:solidFill>
                       <a:srgbClr val="000000"/>
                     </a:solidFill>
@@ -10843,7 +10843,7 @@
               </a:ln>
               <a:extLst>
                 <a:ext uri="{91240B29-F687-4f45-9708-019B960494DF}">
-                  <a14:hiddenLine xmlns="" xmlns:a14="http://schemas.microsoft.com/office/drawing/2010/main" w="9525">
+                  <a14:hiddenLine xmlns:a14="http://schemas.microsoft.com/office/drawing/2010/main" xmlns="" w="9525">
                     <a:solidFill>
                       <a:srgbClr val="000000"/>
                     </a:solidFill>
@@ -10933,7 +10933,7 @@
               </a:ln>
               <a:extLst>
                 <a:ext uri="{91240B29-F687-4f45-9708-019B960494DF}">
-                  <a14:hiddenLine xmlns="" xmlns:a14="http://schemas.microsoft.com/office/drawing/2010/main" w="9525">
+                  <a14:hiddenLine xmlns:a14="http://schemas.microsoft.com/office/drawing/2010/main" xmlns="" w="9525">
                     <a:solidFill>
                       <a:srgbClr val="000000"/>
                     </a:solidFill>
@@ -10998,7 +10998,7 @@
               </a:ln>
               <a:extLst>
                 <a:ext uri="{91240B29-F687-4f45-9708-019B960494DF}">
-                  <a14:hiddenLine xmlns="" xmlns:a14="http://schemas.microsoft.com/office/drawing/2010/main" w="9525">
+                  <a14:hiddenLine xmlns:a14="http://schemas.microsoft.com/office/drawing/2010/main" xmlns="" w="9525">
                     <a:solidFill>
                       <a:srgbClr val="000000"/>
                     </a:solidFill>
@@ -11060,7 +11060,7 @@
               </a:ln>
               <a:extLst>
                 <a:ext uri="{91240B29-F687-4f45-9708-019B960494DF}">
-                  <a14:hiddenLine xmlns="" xmlns:a14="http://schemas.microsoft.com/office/drawing/2010/main" w="9525">
+                  <a14:hiddenLine xmlns:a14="http://schemas.microsoft.com/office/drawing/2010/main" xmlns="" w="9525">
                     <a:solidFill>
                       <a:srgbClr val="000000"/>
                     </a:solidFill>
@@ -11150,7 +11150,7 @@
               </a:ln>
               <a:extLst>
                 <a:ext uri="{91240B29-F687-4f45-9708-019B960494DF}">
-                  <a14:hiddenLine xmlns="" xmlns:a14="http://schemas.microsoft.com/office/drawing/2010/main" w="9525">
+                  <a14:hiddenLine xmlns:a14="http://schemas.microsoft.com/office/drawing/2010/main" xmlns="" w="9525">
                     <a:solidFill>
                       <a:srgbClr val="000000"/>
                     </a:solidFill>
@@ -11240,7 +11240,7 @@
               </a:ln>
               <a:extLst>
                 <a:ext uri="{91240B29-F687-4f45-9708-019B960494DF}">
-                  <a14:hiddenLine xmlns="" xmlns:a14="http://schemas.microsoft.com/office/drawing/2010/main" w="9525">
+                  <a14:hiddenLine xmlns:a14="http://schemas.microsoft.com/office/drawing/2010/main" xmlns="" w="9525">
                     <a:solidFill>
                       <a:srgbClr val="000000"/>
                     </a:solidFill>
@@ -11305,7 +11305,7 @@
               </a:ln>
               <a:extLst>
                 <a:ext uri="{91240B29-F687-4f45-9708-019B960494DF}">
-                  <a14:hiddenLine xmlns="" xmlns:a14="http://schemas.microsoft.com/office/drawing/2010/main" w="9525">
+                  <a14:hiddenLine xmlns:a14="http://schemas.microsoft.com/office/drawing/2010/main" xmlns="" w="9525">
                     <a:solidFill>
                       <a:srgbClr val="000000"/>
                     </a:solidFill>
@@ -11425,7 +11425,7 @@
               </a:ln>
               <a:extLst>
                 <a:ext uri="{91240B29-F687-4f45-9708-019B960494DF}">
-                  <a14:hiddenLine xmlns="" xmlns:a14="http://schemas.microsoft.com/office/drawing/2010/main" w="9525">
+                  <a14:hiddenLine xmlns:a14="http://schemas.microsoft.com/office/drawing/2010/main" xmlns="" w="9525">
                     <a:solidFill>
                       <a:srgbClr val="000000"/>
                     </a:solidFill>
@@ -11523,7 +11523,7 @@
               </a:ln>
               <a:extLst>
                 <a:ext uri="{91240B29-F687-4f45-9708-019B960494DF}">
-                  <a14:hiddenLine xmlns="" xmlns:a14="http://schemas.microsoft.com/office/drawing/2010/main" w="9525">
+                  <a14:hiddenLine xmlns:a14="http://schemas.microsoft.com/office/drawing/2010/main" xmlns="" w="9525">
                     <a:solidFill>
                       <a:srgbClr val="000000"/>
                     </a:solidFill>
@@ -11638,7 +11638,7 @@
               </a:ln>
               <a:extLst>
                 <a:ext uri="{91240B29-F687-4f45-9708-019B960494DF}">
-                  <a14:hiddenLine xmlns="" xmlns:a14="http://schemas.microsoft.com/office/drawing/2010/main" w="9525">
+                  <a14:hiddenLine xmlns:a14="http://schemas.microsoft.com/office/drawing/2010/main" xmlns="" w="9525">
                     <a:solidFill>
                       <a:srgbClr val="000000"/>
                     </a:solidFill>
@@ -11728,7 +11728,7 @@
               </a:ln>
               <a:extLst>
                 <a:ext uri="{91240B29-F687-4f45-9708-019B960494DF}">
-                  <a14:hiddenLine xmlns="" xmlns:a14="http://schemas.microsoft.com/office/drawing/2010/main" w="9525">
+                  <a14:hiddenLine xmlns:a14="http://schemas.microsoft.com/office/drawing/2010/main" xmlns="" w="9525">
                     <a:solidFill>
                       <a:srgbClr val="000000"/>
                     </a:solidFill>
@@ -11793,7 +11793,7 @@
               </a:ln>
               <a:extLst>
                 <a:ext uri="{91240B29-F687-4f45-9708-019B960494DF}">
-                  <a14:hiddenLine xmlns="" xmlns:a14="http://schemas.microsoft.com/office/drawing/2010/main" w="9525">
+                  <a14:hiddenLine xmlns:a14="http://schemas.microsoft.com/office/drawing/2010/main" xmlns="" w="9525">
                     <a:solidFill>
                       <a:srgbClr val="000000"/>
                     </a:solidFill>
@@ -11883,7 +11883,7 @@
               </a:ln>
               <a:extLst>
                 <a:ext uri="{91240B29-F687-4f45-9708-019B960494DF}">
-                  <a14:hiddenLine xmlns="" xmlns:a14="http://schemas.microsoft.com/office/drawing/2010/main" w="9525">
+                  <a14:hiddenLine xmlns:a14="http://schemas.microsoft.com/office/drawing/2010/main" xmlns="" w="9525">
                     <a:solidFill>
                       <a:srgbClr val="000000"/>
                     </a:solidFill>
@@ -11951,7 +11951,7 @@
               </a:ln>
               <a:extLst>
                 <a:ext uri="{91240B29-F687-4f45-9708-019B960494DF}">
-                  <a14:hiddenLine xmlns="" xmlns:a14="http://schemas.microsoft.com/office/drawing/2010/main" w="9525">
+                  <a14:hiddenLine xmlns:a14="http://schemas.microsoft.com/office/drawing/2010/main" xmlns="" w="9525">
                     <a:solidFill>
                       <a:srgbClr val="000000"/>
                     </a:solidFill>
@@ -12041,7 +12041,7 @@
               </a:ln>
               <a:extLst>
                 <a:ext uri="{91240B29-F687-4f45-9708-019B960494DF}">
-                  <a14:hiddenLine xmlns="" xmlns:a14="http://schemas.microsoft.com/office/drawing/2010/main" w="9525">
+                  <a14:hiddenLine xmlns:a14="http://schemas.microsoft.com/office/drawing/2010/main" xmlns="" w="9525">
                     <a:solidFill>
                       <a:srgbClr val="000000"/>
                     </a:solidFill>
@@ -12109,7 +12109,7 @@
               </a:ln>
               <a:extLst>
                 <a:ext uri="{91240B29-F687-4f45-9708-019B960494DF}">
-                  <a14:hiddenLine xmlns="" xmlns:a14="http://schemas.microsoft.com/office/drawing/2010/main" w="9525">
+                  <a14:hiddenLine xmlns:a14="http://schemas.microsoft.com/office/drawing/2010/main" xmlns="" w="9525">
                     <a:solidFill>
                       <a:srgbClr val="000000"/>
                     </a:solidFill>
@@ -12199,7 +12199,7 @@
               </a:ln>
               <a:extLst>
                 <a:ext uri="{91240B29-F687-4f45-9708-019B960494DF}">
-                  <a14:hiddenLine xmlns="" xmlns:a14="http://schemas.microsoft.com/office/drawing/2010/main" w="9525">
+                  <a14:hiddenLine xmlns:a14="http://schemas.microsoft.com/office/drawing/2010/main" xmlns="" w="9525">
                     <a:solidFill>
                       <a:srgbClr val="000000"/>
                     </a:solidFill>
@@ -12233,7 +12233,7 @@
               </a:ln>
               <a:extLst>
                 <a:ext uri="{91240B29-F687-4f45-9708-019B960494DF}">
-                  <a14:hiddenLine xmlns="" xmlns:a14="http://schemas.microsoft.com/office/drawing/2010/main" w="9525">
+                  <a14:hiddenLine xmlns:a14="http://schemas.microsoft.com/office/drawing/2010/main" xmlns="" w="9525">
                     <a:solidFill>
                       <a:srgbClr val="000000"/>
                     </a:solidFill>
@@ -12813,10 +12813,6 @@
               <a:rPr lang="en-US" dirty="0" smtClean="0"/>
               <a:t>, </a:t>
             </a:r>
-            <a:r>
-              <a:rPr lang="en-US" dirty="0" smtClean="0"/>
-              <a:t/>
-            </a:r>
             <a:br>
               <a:rPr lang="en-US" dirty="0" smtClean="0"/>
             </a:br>
@@ -12841,11 +12837,7 @@
             </a:r>
             <a:r>
               <a:rPr lang="en-US" dirty="0" smtClean="0"/>
-              <a:t> </a:t>
-            </a:r>
-            <a:r>
-              <a:rPr lang="en-US" dirty="0" smtClean="0"/>
-              <a:t>Desktop</a:t>
+              <a:t> Desktop</a:t>
             </a:r>
             <a:endParaRPr lang="en-US" dirty="0"/>
           </a:p>
@@ -13080,46 +13072,21 @@
             <a:pPr lvl="1"/>
             <a:r>
               <a:rPr lang="en-US" dirty="0" smtClean="0"/>
-              <a:t>Stores the state </a:t>
-            </a:r>
-            <a:r>
-              <a:rPr lang="en-US" dirty="0" smtClean="0"/>
-              <a:t>history of </a:t>
-            </a:r>
-            <a:r>
-              <a:rPr lang="en-US" dirty="0" smtClean="0"/>
-              <a:t>your project </a:t>
-            </a:r>
-            <a:r>
-              <a:rPr lang="en-US" dirty="0" smtClean="0"/>
-              <a:t>(in a “repository”)</a:t>
+              <a:t>Stores the state history of your project (in a “repository”)</a:t>
             </a:r>
           </a:p>
           <a:p>
             <a:pPr lvl="1"/>
             <a:r>
               <a:rPr lang="en-US" dirty="0" smtClean="0"/>
-              <a:t>Every </a:t>
+              <a:t>Every time you “commit” some changes, a new state is stored.</a:t>
             </a:r>
-            <a:r>
-              <a:rPr lang="en-US" dirty="0" smtClean="0"/>
-              <a:t>time you “commit” some </a:t>
-            </a:r>
-            <a:r>
-              <a:rPr lang="en-US" dirty="0" smtClean="0"/>
-              <a:t>changes, a new state is stored.</a:t>
-            </a:r>
-            <a:endParaRPr lang="en-US" dirty="0" smtClean="0"/>
           </a:p>
           <a:p>
             <a:pPr lvl="1"/>
             <a:r>
               <a:rPr lang="en-US" dirty="0" smtClean="0"/>
-              <a:t>Also allows synchronizing your project “repository” with other computers</a:t>
-            </a:r>
-            <a:r>
-              <a:rPr lang="en-US" dirty="0" smtClean="0"/>
-              <a:t>!</a:t>
+              <a:t>Also allows synchronizing your project “repository” with other computers!</a:t>
             </a:r>
           </a:p>
           <a:p>
@@ -13128,16 +13095,11 @@
               <a:rPr lang="en-US" dirty="0" smtClean="0"/>
               <a:t>Has other fancy capabilities like branching and merging, resetting, releases, </a:t>
             </a:r>
-            <a:endParaRPr lang="en-US" dirty="0" smtClean="0"/>
           </a:p>
           <a:p>
             <a:r>
               <a:rPr lang="en-US" dirty="0" smtClean="0"/>
-              <a:t>GitHub = Popular centralized place to </a:t>
-            </a:r>
-            <a:r>
-              <a:rPr lang="en-US" dirty="0" smtClean="0"/>
-              <a:t>store/share </a:t>
+              <a:t>GitHub = Popular centralized place to store/share </a:t>
             </a:r>
             <a:r>
               <a:rPr lang="en-US" dirty="0" err="1" smtClean="0"/>
@@ -13151,11 +13113,7 @@
           <a:p>
             <a:r>
               <a:rPr lang="en-US" dirty="0" smtClean="0"/>
-              <a:t>GitHub Desktop = a </a:t>
-            </a:r>
-            <a:r>
-              <a:rPr lang="en-US" dirty="0" smtClean="0"/>
-              <a:t>GUI wrapper for </a:t>
+              <a:t>GitHub Desktop = a GUI wrapper for </a:t>
             </a:r>
             <a:r>
               <a:rPr lang="en-US" dirty="0" err="1" smtClean="0"/>
@@ -13762,15 +13720,7 @@
                   <a:schemeClr val="bg1"/>
                 </a:solidFill>
               </a:rPr>
-              <a:t>Versions get </a:t>
-            </a:r>
-            <a:r>
-              <a:rPr lang="en-US" dirty="0" smtClean="0">
-                <a:solidFill>
-                  <a:schemeClr val="bg1"/>
-                </a:solidFill>
-              </a:rPr>
-              <a:t>slacked, e-mailed, stored in network folders</a:t>
+              <a:t>Versions get slacked, e-mailed, stored in network folders</a:t>
             </a:r>
           </a:p>
           <a:p>
@@ -13782,11 +13732,6 @@
               </a:rPr>
               <a:t>Naming schemes build up like geological layers, sometimes they reflect what’s in the code, sometimes they don’t</a:t>
             </a:r>
-            <a:endParaRPr lang="en-US" dirty="0" smtClean="0">
-              <a:solidFill>
-                <a:schemeClr val="bg1"/>
-              </a:solidFill>
-            </a:endParaRPr>
           </a:p>
           <a:p>
             <a:r>
@@ -13797,11 +13742,6 @@
               </a:rPr>
               <a:t>Problems arise:</a:t>
             </a:r>
-            <a:endParaRPr lang="en-US" dirty="0" smtClean="0">
-              <a:solidFill>
-                <a:schemeClr val="bg1"/>
-              </a:solidFill>
-            </a:endParaRPr>
           </a:p>
           <a:p>
             <a:r>
@@ -13810,23 +13750,7 @@
                   <a:srgbClr val="C00000"/>
                 </a:solidFill>
               </a:rPr>
-              <a:t>Which one is the latest version? When was this version made? </a:t>
-            </a:r>
-            <a:r>
-              <a:rPr lang="en-US" dirty="0" smtClean="0">
-                <a:solidFill>
-                  <a:srgbClr val="C00000"/>
-                </a:solidFill>
-              </a:rPr>
-              <a:t>Who made it? What’s </a:t>
-            </a:r>
-            <a:r>
-              <a:rPr lang="en-US" dirty="0" smtClean="0">
-                <a:solidFill>
-                  <a:srgbClr val="C00000"/>
-                </a:solidFill>
-              </a:rPr>
-              <a:t>different about these two versions? Which version has that one feature I need? I made a mistake in this code! How do I go back to a previous state?! How do I make my code available for publication?</a:t>
+              <a:t>Which one is the latest version? When was this version made? Who made it? What’s different about these two versions? Which version has that one feature I need? I made a mistake in this code! How do I go back to a previous state?! How do I make my code available for publication?</a:t>
             </a:r>
             <a:endParaRPr lang="en-US" dirty="0">
               <a:solidFill>
@@ -13934,8 +13858,22 @@
             <a:pPr lvl="1"/>
             <a:r>
               <a:rPr lang="en-US" dirty="0" smtClean="0"/>
-              <a:t>Run the code</a:t>
+              <a:t>Run the </a:t>
             </a:r>
+            <a:r>
+              <a:rPr lang="en-US" dirty="0" smtClean="0"/>
+              <a:t>code</a:t>
+            </a:r>
+          </a:p>
+          <a:p>
+            <a:pPr marL="457200" lvl="1" indent="0">
+              <a:buNone/>
+            </a:pPr>
+            <a:r>
+              <a:rPr lang="en-US" dirty="0" smtClean="0"/>
+              <a:t>(I’ll make a change to the code)</a:t>
+            </a:r>
+            <a:endParaRPr lang="en-US" dirty="0" smtClean="0"/>
           </a:p>
           <a:p>
             <a:pPr lvl="1"/>

</xml_diff>